<commit_message>
Second updates from mbarnes
</commit_message>
<xml_diff>
--- a/MKICrossSectionYZ.pptx
+++ b/MKICrossSectionYZ.pptx
@@ -288,7 +288,7 @@
           <a:p>
             <a:fld id="{BDCC3067-275F-4497-AB09-18207AA53E10}" type="datetimeFigureOut">
               <a:rPr lang="en-GB" smtClean="0"/>
-              <a:t>12/04/2013</a:t>
+              <a:t>22/04/2013</a:t>
             </a:fld>
             <a:endParaRPr lang="en-GB"/>
           </a:p>
@@ -458,7 +458,7 @@
           <a:p>
             <a:fld id="{BDCC3067-275F-4497-AB09-18207AA53E10}" type="datetimeFigureOut">
               <a:rPr lang="en-GB" smtClean="0"/>
-              <a:t>12/04/2013</a:t>
+              <a:t>22/04/2013</a:t>
             </a:fld>
             <a:endParaRPr lang="en-GB"/>
           </a:p>
@@ -638,7 +638,7 @@
           <a:p>
             <a:fld id="{BDCC3067-275F-4497-AB09-18207AA53E10}" type="datetimeFigureOut">
               <a:rPr lang="en-GB" smtClean="0"/>
-              <a:t>12/04/2013</a:t>
+              <a:t>22/04/2013</a:t>
             </a:fld>
             <a:endParaRPr lang="en-GB"/>
           </a:p>
@@ -808,7 +808,7 @@
           <a:p>
             <a:fld id="{BDCC3067-275F-4497-AB09-18207AA53E10}" type="datetimeFigureOut">
               <a:rPr lang="en-GB" smtClean="0"/>
-              <a:t>12/04/2013</a:t>
+              <a:t>22/04/2013</a:t>
             </a:fld>
             <a:endParaRPr lang="en-GB"/>
           </a:p>
@@ -1054,7 +1054,7 @@
           <a:p>
             <a:fld id="{BDCC3067-275F-4497-AB09-18207AA53E10}" type="datetimeFigureOut">
               <a:rPr lang="en-GB" smtClean="0"/>
-              <a:t>12/04/2013</a:t>
+              <a:t>22/04/2013</a:t>
             </a:fld>
             <a:endParaRPr lang="en-GB"/>
           </a:p>
@@ -1342,7 +1342,7 @@
           <a:p>
             <a:fld id="{BDCC3067-275F-4497-AB09-18207AA53E10}" type="datetimeFigureOut">
               <a:rPr lang="en-GB" smtClean="0"/>
-              <a:t>12/04/2013</a:t>
+              <a:t>22/04/2013</a:t>
             </a:fld>
             <a:endParaRPr lang="en-GB"/>
           </a:p>
@@ -1769,7 +1769,7 @@
           <a:p>
             <a:fld id="{BDCC3067-275F-4497-AB09-18207AA53E10}" type="datetimeFigureOut">
               <a:rPr lang="en-GB" smtClean="0"/>
-              <a:t>12/04/2013</a:t>
+              <a:t>22/04/2013</a:t>
             </a:fld>
             <a:endParaRPr lang="en-GB"/>
           </a:p>
@@ -1887,7 +1887,7 @@
           <a:p>
             <a:fld id="{BDCC3067-275F-4497-AB09-18207AA53E10}" type="datetimeFigureOut">
               <a:rPr lang="en-GB" smtClean="0"/>
-              <a:t>12/04/2013</a:t>
+              <a:t>22/04/2013</a:t>
             </a:fld>
             <a:endParaRPr lang="en-GB"/>
           </a:p>
@@ -1982,7 +1982,7 @@
           <a:p>
             <a:fld id="{BDCC3067-275F-4497-AB09-18207AA53E10}" type="datetimeFigureOut">
               <a:rPr lang="en-GB" smtClean="0"/>
-              <a:t>12/04/2013</a:t>
+              <a:t>22/04/2013</a:t>
             </a:fld>
             <a:endParaRPr lang="en-GB"/>
           </a:p>
@@ -2259,7 +2259,7 @@
           <a:p>
             <a:fld id="{BDCC3067-275F-4497-AB09-18207AA53E10}" type="datetimeFigureOut">
               <a:rPr lang="en-GB" smtClean="0"/>
-              <a:t>12/04/2013</a:t>
+              <a:t>22/04/2013</a:t>
             </a:fld>
             <a:endParaRPr lang="en-GB"/>
           </a:p>
@@ -2512,7 +2512,7 @@
           <a:p>
             <a:fld id="{BDCC3067-275F-4497-AB09-18207AA53E10}" type="datetimeFigureOut">
               <a:rPr lang="en-GB" smtClean="0"/>
-              <a:t>12/04/2013</a:t>
+              <a:t>22/04/2013</a:t>
             </a:fld>
             <a:endParaRPr lang="en-GB"/>
           </a:p>
@@ -2725,7 +2725,7 @@
           <a:p>
             <a:fld id="{BDCC3067-275F-4497-AB09-18207AA53E10}" type="datetimeFigureOut">
               <a:rPr lang="en-GB" smtClean="0"/>
-              <a:t>12/04/2013</a:t>
+              <a:t>22/04/2013</a:t>
             </a:fld>
             <a:endParaRPr lang="en-GB"/>
           </a:p>
@@ -3372,8 +3372,8 @@
         </p:nvCxnSpPr>
         <p:spPr>
           <a:xfrm flipV="1">
-            <a:off x="9675978" y="2429108"/>
-            <a:ext cx="0" cy="621898"/>
+            <a:off x="9325149" y="2429108"/>
+            <a:ext cx="350829" cy="650375"/>
           </a:xfrm>
           <a:prstGeom prst="straightConnector1">
             <a:avLst/>
@@ -3856,8 +3856,8 @@
         </p:nvSpPr>
         <p:spPr>
           <a:xfrm>
-            <a:off x="9361115" y="1280261"/>
-            <a:ext cx="1224136" cy="276999"/>
+            <a:off x="9163533" y="867483"/>
+            <a:ext cx="1421718" cy="584775"/>
           </a:xfrm>
           <a:prstGeom prst="rect">
             <a:avLst/>
@@ -3873,14 +3873,14 @@
           <a:lstStyle/>
           <a:p>
             <a:r>
-              <a:rPr lang="en-GB" sz="1200" dirty="0" smtClean="0"/>
+              <a:rPr lang="en-GB" sz="1600" dirty="0" smtClean="0"/>
               <a:t>PT-100 </a:t>
             </a:r>
             <a:r>
-              <a:rPr lang="en-GB" sz="1200" dirty="0" err="1" smtClean="0"/>
+              <a:rPr lang="en-GB" sz="1600" dirty="0" err="1" smtClean="0"/>
               <a:t>Mag_Up</a:t>
             </a:r>
-            <a:endParaRPr lang="en-GB" sz="1200" dirty="0"/>
+            <a:endParaRPr lang="en-GB" sz="1600" dirty="0"/>
           </a:p>
         </p:txBody>
       </p:sp>
@@ -3892,8 +3892,8 @@
         </p:nvCxnSpPr>
         <p:spPr>
           <a:xfrm flipH="1">
-            <a:off x="9289107" y="1557260"/>
-            <a:ext cx="288032" cy="871848"/>
+            <a:off x="9289107" y="1452258"/>
+            <a:ext cx="288032" cy="976850"/>
           </a:xfrm>
           <a:prstGeom prst="straightConnector1">
             <a:avLst/>
@@ -3928,8 +3928,8 @@
         </p:nvSpPr>
         <p:spPr>
           <a:xfrm>
-            <a:off x="116891" y="2984832"/>
-            <a:ext cx="1395351" cy="276999"/>
+            <a:off x="1233016" y="3108177"/>
+            <a:ext cx="1395351" cy="584775"/>
           </a:xfrm>
           <a:prstGeom prst="rect">
             <a:avLst/>
@@ -3945,14 +3945,14 @@
           <a:lstStyle/>
           <a:p>
             <a:r>
-              <a:rPr lang="en-GB" sz="1200" dirty="0" smtClean="0"/>
+              <a:rPr lang="en-GB" sz="1600" dirty="0" smtClean="0"/>
               <a:t>PT-100 </a:t>
             </a:r>
             <a:r>
-              <a:rPr lang="en-GB" sz="1200" dirty="0" err="1" smtClean="0"/>
+              <a:rPr lang="en-GB" sz="1600" dirty="0" err="1" smtClean="0"/>
               <a:t>Mag_Down</a:t>
             </a:r>
-            <a:endParaRPr lang="en-GB" sz="1200" dirty="0"/>
+            <a:endParaRPr lang="en-GB" sz="1600" dirty="0"/>
           </a:p>
         </p:txBody>
       </p:sp>
@@ -3963,9 +3963,9 @@
           <p:nvPr/>
         </p:nvCxnSpPr>
         <p:spPr>
-          <a:xfrm flipV="1">
-            <a:off x="1052996" y="2487374"/>
-            <a:ext cx="324036" cy="497458"/>
+          <a:xfrm flipH="1" flipV="1">
+            <a:off x="1377032" y="2487374"/>
+            <a:ext cx="63203" cy="620803"/>
           </a:xfrm>
           <a:prstGeom prst="straightConnector1">
             <a:avLst/>
@@ -4000,8 +4000,8 @@
         </p:nvCxnSpPr>
         <p:spPr>
           <a:xfrm flipV="1">
-            <a:off x="601435" y="2304454"/>
-            <a:ext cx="334744" cy="200797"/>
+            <a:off x="656952" y="2304455"/>
+            <a:ext cx="279227" cy="412314"/>
           </a:xfrm>
           <a:prstGeom prst="straightConnector1">
             <a:avLst/>
@@ -4036,8 +4036,8 @@
         </p:nvSpPr>
         <p:spPr>
           <a:xfrm>
-            <a:off x="1" y="2429108"/>
-            <a:ext cx="1152202" cy="523220"/>
+            <a:off x="-1" y="2716769"/>
+            <a:ext cx="1296219" cy="646331"/>
           </a:xfrm>
           <a:prstGeom prst="rect">
             <a:avLst/>
@@ -4053,14 +4053,14 @@
           <a:lstStyle/>
           <a:p>
             <a:r>
-              <a:rPr lang="en-GB" sz="1400" dirty="0" smtClean="0"/>
+              <a:rPr lang="en-GB" dirty="0" smtClean="0"/>
               <a:t>PT-100 </a:t>
             </a:r>
             <a:r>
-              <a:rPr lang="en-GB" sz="1400" dirty="0" err="1" smtClean="0"/>
+              <a:rPr lang="en-GB" dirty="0" err="1" smtClean="0"/>
               <a:t>Tube_Down</a:t>
             </a:r>
-            <a:endParaRPr lang="en-GB" sz="1400" dirty="0"/>
+            <a:endParaRPr lang="en-GB" dirty="0"/>
           </a:p>
         </p:txBody>
       </p:sp>
@@ -4072,8 +4072,8 @@
         </p:nvSpPr>
         <p:spPr>
           <a:xfrm>
-            <a:off x="9806692" y="2404852"/>
-            <a:ext cx="864170" cy="523220"/>
+            <a:off x="9744511" y="2495544"/>
+            <a:ext cx="926351" cy="553998"/>
           </a:xfrm>
           <a:prstGeom prst="rect">
             <a:avLst/>
@@ -4093,7 +4093,7 @@
               <a:t>PT-100 </a:t>
             </a:r>
             <a:r>
-              <a:rPr lang="en-GB" sz="1400" dirty="0" err="1" smtClean="0"/>
+              <a:rPr lang="en-GB" sz="1600" dirty="0" err="1" smtClean="0"/>
               <a:t>Tube_Up</a:t>
             </a:r>
             <a:endParaRPr lang="en-GB" sz="1400" dirty="0"/>
@@ -4214,7 +4214,7 @@
         </p:nvSpPr>
         <p:spPr>
           <a:xfrm>
-            <a:off x="8919856" y="3051006"/>
+            <a:off x="8569027" y="3079483"/>
             <a:ext cx="1512243" cy="646331"/>
           </a:xfrm>
           <a:prstGeom prst="rect">

</xml_diff>